<commit_message>
updates in rec 2 slides
</commit_message>
<xml_diff>
--- a/week2/CS1550_week_2_xv6_intro.pptx
+++ b/week2/CS1550_week_2_xv6_intro.pptx
@@ -64,7 +64,7 @@
     <p:sldId id="419" r:id="rId52"/>
     <p:sldId id="420" r:id="rId53"/>
     <p:sldId id="406" r:id="rId54"/>
-    <p:sldId id="389" r:id="rId55"/>
+    <p:sldId id="429" r:id="rId55"/>
   </p:sldIdLst>
   <p:sldSz cx="12192000" cy="6858000"/>
   <p:notesSz cx="6858000" cy="9144000"/>
@@ -15291,12 +15291,12 @@
         <p:spPr>
           <a:xfrm>
             <a:off x="838200" y="1825625"/>
-            <a:ext cx="10515600" cy="2520597"/>
+            <a:ext cx="10515600" cy="2998311"/>
           </a:xfrm>
         </p:spPr>
         <p:txBody>
           <a:bodyPr>
-            <a:normAutofit/>
+            <a:normAutofit lnSpcReduction="10000"/>
           </a:bodyPr>
           <a:lstStyle/>
           <a:p>
@@ -15306,9 +15306,6 @@
             </a:r>
           </a:p>
           <a:p>
-            <a:pPr marL="0" indent="0">
-              <a:buNone/>
-            </a:pPr>
             <a:endParaRPr lang="en-US" dirty="0"/>
           </a:p>
           <a:p>
@@ -15343,6 +15340,24 @@
               <a:t>syscalls</a:t>
             </a:r>
             <a:endParaRPr lang="en-US" b="1" dirty="0"/>
+          </a:p>
+          <a:p>
+            <a:pPr lvl="1"/>
+            <a:endParaRPr lang="en-US" b="1" dirty="0"/>
+          </a:p>
+          <a:p>
+            <a:r>
+              <a:rPr lang="en-US" dirty="0"/>
+              <a:t>Add the following to </a:t>
+            </a:r>
+            <a:r>
+              <a:rPr lang="en-US" dirty="0" err="1"/>
+              <a:t>sysproc.c</a:t>
+            </a:r>
+            <a:r>
+              <a:rPr lang="en-US" dirty="0"/>
+              <a:t>:</a:t>
+            </a:r>
           </a:p>
         </p:txBody>
       </p:sp>
@@ -17042,15 +17057,7 @@
           <a:p>
             <a:r>
               <a:rPr lang="en-US" dirty="0"/>
-              <a:t>CS 1550 – xv6 – Adding a custom </a:t>
-            </a:r>
-            <a:r>
-              <a:rPr lang="en-US" dirty="0" err="1"/>
-              <a:t>Syscall</a:t>
-            </a:r>
-            <a:r>
-              <a:rPr lang="en-US" dirty="0"/>
-              <a:t> </a:t>
+              <a:t>CS 1550 – xv6 – Done!</a:t>
             </a:r>
           </a:p>
         </p:txBody>
@@ -17077,38 +17084,71 @@
           </a:bodyPr>
           <a:lstStyle/>
           <a:p>
-            <a:r>
-              <a:rPr lang="en-US" dirty="0"/>
-              <a:t>Adding an user program</a:t>
+            <a:pPr marL="457200" lvl="1" indent="0">
+              <a:buNone/>
+            </a:pPr>
+            <a:r>
+              <a:rPr lang="en-US" dirty="0"/>
+              <a:t>Now, you can fire up your </a:t>
+            </a:r>
+            <a:r>
+              <a:rPr lang="en-US" dirty="0" err="1"/>
+              <a:t>ssh</a:t>
+            </a:r>
+            <a:r>
+              <a:rPr lang="en-US" dirty="0"/>
+              <a:t> to linux.cs.pitt.edu, then:</a:t>
             </a:r>
           </a:p>
           <a:p>
             <a:pPr lvl="1"/>
             <a:r>
-              <a:rPr lang="en-US" dirty="0"/>
-              <a:t>Open </a:t>
-            </a:r>
-            <a:r>
-              <a:rPr lang="en-US" dirty="0" err="1"/>
-              <a:t>makefile</a:t>
-            </a:r>
+              <a:rPr lang="en-US" b="1" dirty="0"/>
+              <a:t>git pull</a:t>
+            </a:r>
+          </a:p>
+          <a:p>
+            <a:pPr lvl="1"/>
+            <a:r>
+              <a:rPr lang="en-US" b="1" dirty="0"/>
+              <a:t>make </a:t>
+            </a:r>
+            <a:r>
+              <a:rPr lang="en-US" b="1" dirty="0" err="1"/>
+              <a:t>qemu-nox</a:t>
+            </a:r>
+            <a:endParaRPr lang="en-US" b="1" dirty="0"/>
+          </a:p>
+          <a:p>
+            <a:pPr lvl="1"/>
+            <a:r>
+              <a:rPr lang="en-US" b="1" dirty="0" err="1"/>
+              <a:t>todays_date</a:t>
+            </a:r>
+            <a:r>
+              <a:rPr lang="en-US" b="1" dirty="0"/>
+              <a:t> </a:t>
+            </a:r>
+            <a:r>
+              <a:rPr lang="en-US" dirty="0"/>
+              <a:t>(run this inside the xv6)</a:t>
+            </a:r>
+            <a:br>
+              <a:rPr lang="en-US" dirty="0"/>
+            </a:br>
             <a:endParaRPr lang="en-US" dirty="0"/>
           </a:p>
           <a:p>
+            <a:r>
+              <a:rPr lang="en-US" dirty="0"/>
+              <a:t>You get this slide and code at :</a:t>
+            </a:r>
+          </a:p>
+          <a:p>
             <a:pPr lvl="1"/>
-            <a:endParaRPr lang="en-US" dirty="0"/>
-          </a:p>
-          <a:p>
-            <a:r>
-              <a:rPr lang="en-US" dirty="0"/>
-              <a:t>You get this slide at:</a:t>
-            </a:r>
-          </a:p>
-          <a:p>
-            <a:pPr lvl="1"/>
-            <a:r>
-              <a:rPr lang="en-US" dirty="0"/>
-              <a:t>people.cs.pitt.edu/~henriquepotter/project1/resources/CS01550_Lab2.pdf</a:t>
+            <a:r>
+              <a:rPr lang="en-US" dirty="0"/>
+              <a:t>https://github.com/maher460/Pitt_CS1550_recitation_materials</a:t>
             </a:r>
           </a:p>
         </p:txBody>
@@ -17363,7 +17403,7 @@
         </p:spPr>
         <p:txBody>
           <a:bodyPr>
-            <a:normAutofit/>
+            <a:normAutofit fontScale="92500" lnSpcReduction="10000"/>
           </a:bodyPr>
           <a:lstStyle/>
           <a:p>
@@ -17382,18 +17422,24 @@
             <a:endParaRPr lang="en-US" dirty="0"/>
           </a:p>
           <a:p>
+            <a:r>
+              <a:rPr lang="en-US" dirty="0"/>
+              <a:t>Teaching Assistant</a:t>
+            </a:r>
+          </a:p>
+          <a:p>
+            <a:r>
+              <a:rPr lang="en-US" dirty="0"/>
+              <a:t>Maher Khan</a:t>
+            </a:r>
+          </a:p>
+          <a:p>
             <a:endParaRPr lang="en-US" dirty="0"/>
           </a:p>
           <a:p>
             <a:r>
-              <a:rPr lang="en-US" dirty="0"/>
-              <a:t>Teaching Assistant</a:t>
-            </a:r>
-          </a:p>
-          <a:p>
-            <a:r>
-              <a:rPr lang="en-US" dirty="0"/>
-              <a:t>Henrique Potter</a:t>
+              <a:rPr lang="en-US" sz="2200" dirty="0"/>
+              <a:t>(Slides credited to Henrique Potter)</a:t>
             </a:r>
           </a:p>
         </p:txBody>
@@ -17442,7 +17488,7 @@
     </p:spTree>
     <p:extLst>
       <p:ext uri="{BB962C8B-B14F-4D97-AF65-F5344CB8AC3E}">
-        <p14:creationId xmlns:p14="http://schemas.microsoft.com/office/powerpoint/2010/main" val="308065839"/>
+        <p14:creationId xmlns:p14="http://schemas.microsoft.com/office/powerpoint/2010/main" val="489469861"/>
       </p:ext>
     </p:extLst>
   </p:cSld>

</xml_diff>